<commit_message>
Added a point to the Testing slide in the PowerPoint presentation.
</commit_message>
<xml_diff>
--- a/Raytheon Project Presentation.pptx
+++ b/Raytheon Project Presentation.pptx
@@ -109,6 +109,11 @@
       </a:defRPr>
     </a:lvl9pPr>
   </p:defaultTextStyle>
+  <p:extLst>
+    <p:ext uri="{EFAFB233-063F-42B5-8137-9DF3F51BA10A}">
+      <p15:sldGuideLst xmlns:p15="http://schemas.microsoft.com/office/powerpoint/2012/main"/>
+    </p:ext>
+  </p:extLst>
 </p:presentation>
 </file>
 
@@ -6208,6 +6213,12 @@
           <a:p>
             <a:r>
               <a:rPr lang="en-GB" dirty="0"/>
+              <a:t>Unit tests where created after each function/method before starting a new method/function. I chose to do this rather than do the test first because I had more experience doing it this way and to me its easier to write a test for something you have created than to write a test before that.</a:t>
+            </a:r>
+          </a:p>
+          <a:p>
+            <a:r>
+              <a:rPr lang="en-GB" dirty="0"/>
               <a:t>All Unit Tests passed.</a:t>
             </a:r>
           </a:p>

</xml_diff>